<commit_message>
slight edits to slides
</commit_message>
<xml_diff>
--- a/active_learning_workshop.pptx
+++ b/active_learning_workshop.pptx
@@ -21858,7 +21858,7 @@
         <p:spPr>
           <a:xfrm>
             <a:off x="3220083" y="4564062"/>
-            <a:ext cx="4826954" cy="923330"/>
+            <a:ext cx="4826954" cy="1144929"/>
           </a:xfrm>
           <a:prstGeom prst="rect">
             <a:avLst/>
@@ -22098,7 +22098,16 @@
                 </a:solidFill>
                 <a:latin typeface="+mn-lt"/>
               </a:rPr>
-              <a:t>Use better features</a:t>
+              <a:t>Use better features </a:t>
+            </a:r>
+            <a:r>
+              <a:rPr lang="en-US" sz="1600" dirty="0">
+                <a:solidFill>
+                  <a:srgbClr val="0070C0"/>
+                </a:solidFill>
+                <a:latin typeface="+mn-lt"/>
+              </a:rPr>
+              <a:t>(differentiable programming to automatically learn good features)</a:t>
             </a:r>
           </a:p>
           <a:p>

</xml_diff>